<commit_message>
Little correction in presentation.
</commit_message>
<xml_diff>
--- a/5.Test Cases/Artifacts of testing.pptx
+++ b/5.Test Cases/Artifacts of testing.pptx
@@ -134,7 +134,7 @@
   </p:defaultTextStyle>
   <p:extLst>
     <p:ext uri="{EFAFB233-063F-42B5-8137-9DF3F51BA10A}">
-      <p15:sldGuideLst xmlns:p15="http://schemas.microsoft.com/office/powerpoint/2012/main">
+      <p15:sldGuideLst xmlns:p15="http://schemas.microsoft.com/office/powerpoint/2012/main" xmlns="">
         <p15:guide id="1" orient="horz" pos="2160">
           <p15:clr>
             <a:srgbClr val="A4A3A4"/>
@@ -148,7 +148,7 @@
       </p15:sldGuideLst>
     </p:ext>
     <p:ext uri="{2D200454-40CA-4A62-9FC3-DE9A4176ACB9}">
-      <p15:notesGuideLst xmlns:p15="http://schemas.microsoft.com/office/powerpoint/2012/main"/>
+      <p15:notesGuideLst xmlns:p15="http://schemas.microsoft.com/office/powerpoint/2012/main" xmlns=""/>
     </p:ext>
   </p:extLst>
 </p:presentation>
@@ -236,7 +236,7 @@
           <a:p>
             <a:fld id="{0849F342-5BFF-4C37-8A66-D5D0921B0636}" type="datetimeFigureOut">
               <a:rPr lang="ru-RU" smtClean="0"/>
-              <a:t>01.04.2013</a:t>
+              <a:t>10.12.2014</a:t>
             </a:fld>
             <a:endParaRPr lang="ru-RU"/>
           </a:p>
@@ -501,7 +501,7 @@
             <a:fld id="{1D8BD707-D9CF-40AE-B4C6-C98DA3205C09}" type="datetimeFigureOut">
               <a:rPr lang="en-US" smtClean="0"/>
               <a:pPr/>
-              <a:t>4/1/2013</a:t>
+              <a:t>12/10/2014</a:t>
             </a:fld>
             <a:endParaRPr lang="en-US"/>
           </a:p>
@@ -668,7 +668,7 @@
             <a:fld id="{1D8BD707-D9CF-40AE-B4C6-C98DA3205C09}" type="datetimeFigureOut">
               <a:rPr lang="en-US" smtClean="0"/>
               <a:pPr/>
-              <a:t>4/1/2013</a:t>
+              <a:t>12/10/2014</a:t>
             </a:fld>
             <a:endParaRPr lang="en-US"/>
           </a:p>
@@ -845,7 +845,7 @@
             <a:fld id="{1D8BD707-D9CF-40AE-B4C6-C98DA3205C09}" type="datetimeFigureOut">
               <a:rPr lang="en-US" smtClean="0"/>
               <a:pPr/>
-              <a:t>4/1/2013</a:t>
+              <a:t>12/10/2014</a:t>
             </a:fld>
             <a:endParaRPr lang="en-US"/>
           </a:p>
@@ -1012,7 +1012,7 @@
             <a:fld id="{1D8BD707-D9CF-40AE-B4C6-C98DA3205C09}" type="datetimeFigureOut">
               <a:rPr lang="en-US" smtClean="0"/>
               <a:pPr/>
-              <a:t>4/1/2013</a:t>
+              <a:t>12/10/2014</a:t>
             </a:fld>
             <a:endParaRPr lang="en-US"/>
           </a:p>
@@ -1255,7 +1255,7 @@
             <a:fld id="{1D8BD707-D9CF-40AE-B4C6-C98DA3205C09}" type="datetimeFigureOut">
               <a:rPr lang="en-US" smtClean="0"/>
               <a:pPr/>
-              <a:t>4/1/2013</a:t>
+              <a:t>12/10/2014</a:t>
             </a:fld>
             <a:endParaRPr lang="en-US"/>
           </a:p>
@@ -1540,7 +1540,7 @@
             <a:fld id="{1D8BD707-D9CF-40AE-B4C6-C98DA3205C09}" type="datetimeFigureOut">
               <a:rPr lang="en-US" smtClean="0"/>
               <a:pPr/>
-              <a:t>4/1/2013</a:t>
+              <a:t>12/10/2014</a:t>
             </a:fld>
             <a:endParaRPr lang="en-US"/>
           </a:p>
@@ -1959,7 +1959,7 @@
             <a:fld id="{1D8BD707-D9CF-40AE-B4C6-C98DA3205C09}" type="datetimeFigureOut">
               <a:rPr lang="en-US" smtClean="0"/>
               <a:pPr/>
-              <a:t>4/1/2013</a:t>
+              <a:t>12/10/2014</a:t>
             </a:fld>
             <a:endParaRPr lang="en-US"/>
           </a:p>
@@ -2074,7 +2074,7 @@
             <a:fld id="{1D8BD707-D9CF-40AE-B4C6-C98DA3205C09}" type="datetimeFigureOut">
               <a:rPr lang="en-US" smtClean="0"/>
               <a:pPr/>
-              <a:t>4/1/2013</a:t>
+              <a:t>12/10/2014</a:t>
             </a:fld>
             <a:endParaRPr lang="en-US"/>
           </a:p>
@@ -2166,7 +2166,7 @@
             <a:fld id="{1D8BD707-D9CF-40AE-B4C6-C98DA3205C09}" type="datetimeFigureOut">
               <a:rPr lang="en-US" smtClean="0"/>
               <a:pPr/>
-              <a:t>4/1/2013</a:t>
+              <a:t>12/10/2014</a:t>
             </a:fld>
             <a:endParaRPr lang="en-US"/>
           </a:p>
@@ -2440,7 +2440,7 @@
             <a:fld id="{1D8BD707-D9CF-40AE-B4C6-C98DA3205C09}" type="datetimeFigureOut">
               <a:rPr lang="en-US" smtClean="0"/>
               <a:pPr/>
-              <a:t>4/1/2013</a:t>
+              <a:t>12/10/2014</a:t>
             </a:fld>
             <a:endParaRPr lang="en-US"/>
           </a:p>
@@ -2690,7 +2690,7 @@
             <a:fld id="{1D8BD707-D9CF-40AE-B4C6-C98DA3205C09}" type="datetimeFigureOut">
               <a:rPr lang="en-US" smtClean="0"/>
               <a:pPr/>
-              <a:t>4/1/2013</a:t>
+              <a:t>12/10/2014</a:t>
             </a:fld>
             <a:endParaRPr lang="en-US"/>
           </a:p>
@@ -2909,7 +2909,7 @@
             <a:fld id="{1D8BD707-D9CF-40AE-B4C6-C98DA3205C09}" type="datetimeFigureOut">
               <a:rPr lang="en-US" smtClean="0"/>
               <a:pPr/>
-              <a:t>4/1/2013</a:t>
+              <a:t>12/10/2014</a:t>
             </a:fld>
             <a:endParaRPr lang="en-US"/>
           </a:p>
@@ -15943,13 +15943,13 @@
         </p:nvSpPr>
         <p:spPr>
           <a:xfrm>
-            <a:off x="228600" y="1295400"/>
+            <a:off x="228600" y="1219200"/>
             <a:ext cx="8305800" cy="4800600"/>
           </a:xfrm>
         </p:spPr>
         <p:txBody>
           <a:bodyPr>
-            <a:normAutofit lnSpcReduction="10000"/>
+            <a:normAutofit/>
           </a:bodyPr>
           <a:lstStyle/>
           <a:p>
@@ -16082,12 +16082,12 @@
               <a:t>Возможность организовывать и </a:t>
             </a:r>
             <a:r>
-              <a:rPr lang="en-US" sz="1600" dirty="0" smtClean="0"/>
-              <a:t>Ability to organize and </a:t>
+              <a:rPr lang="ru-RU" sz="1600" dirty="0" smtClean="0"/>
+              <a:t>распределять </a:t>
             </a:r>
             <a:r>
               <a:rPr lang="ru-RU" sz="1600" dirty="0"/>
-              <a:t>распределять по категориям </a:t>
+              <a:t>по категориям </a:t>
             </a:r>
             <a:r>
               <a:rPr lang="en-US" sz="1600" dirty="0" smtClean="0"/>
@@ -16298,48 +16298,6 @@
             <a:r>
               <a:rPr lang="en-US" sz="1600" dirty="0" smtClean="0"/>
               <a:t>:</a:t>
-            </a:r>
-          </a:p>
-          <a:p>
-            <a:pPr marL="457200" lvl="1" indent="0" algn="just">
-              <a:spcAft>
-                <a:spcPts val="600"/>
-              </a:spcAft>
-              <a:buClr>
-                <a:schemeClr val="accent4">
-                  <a:lumMod val="75000"/>
-                </a:schemeClr>
-              </a:buClr>
-              <a:buSzPct val="150000"/>
-              <a:buNone/>
-            </a:pPr>
-            <a:r>
-              <a:rPr lang="en-US" sz="1600" b="1" dirty="0" smtClean="0"/>
-              <a:t>Testing </a:t>
-            </a:r>
-            <a:r>
-              <a:rPr lang="en-US" sz="1600" b="1" dirty="0"/>
-              <a:t>Summary </a:t>
-            </a:r>
-            <a:r>
-              <a:rPr lang="en-US" sz="1600" b="1" dirty="0" smtClean="0"/>
-              <a:t>report</a:t>
-            </a:r>
-            <a:r>
-              <a:rPr lang="ru-RU" sz="1600" b="1" dirty="0" smtClean="0"/>
-              <a:t>, </a:t>
-            </a:r>
-            <a:r>
-              <a:rPr lang="en-US" sz="1600" b="1" dirty="0"/>
-              <a:t>Change </a:t>
-            </a:r>
-            <a:r>
-              <a:rPr lang="en-US" sz="1600" b="1" dirty="0" smtClean="0"/>
-              <a:t>List</a:t>
-            </a:r>
-            <a:r>
-              <a:rPr lang="en-US" sz="1600" b="1" dirty="0"/>
-              <a:t>, Defect Report</a:t>
             </a:r>
             <a:endParaRPr lang="en-US" sz="1600" dirty="0" smtClean="0"/>
           </a:p>
@@ -18994,7 +18952,7 @@
         <p:spPr>
           <a:xfrm>
             <a:off x="762000" y="4572000"/>
-            <a:ext cx="7162800" cy="1015663"/>
+            <a:ext cx="7162800" cy="1323439"/>
           </a:xfrm>
           <a:prstGeom prst="rect">
             <a:avLst/>
@@ -19036,19 +18994,35 @@
             </a:r>
             <a:r>
               <a:rPr lang="ru-RU" sz="2000" dirty="0" smtClean="0"/>
-              <a:t>Видам тестирования</a:t>
+              <a:t>Видам </a:t>
+            </a:r>
+            <a:r>
+              <a:rPr lang="ru-RU" sz="2000" dirty="0" smtClean="0"/>
+              <a:t>тестирования</a:t>
             </a:r>
             <a:endParaRPr lang="en-US" sz="2000" dirty="0" smtClean="0"/>
           </a:p>
           <a:p>
             <a:pPr lvl="0"/>
             <a:r>
-              <a:rPr lang="en-US" sz="2000" dirty="0" smtClean="0"/>
-              <a:t>- </a:t>
-            </a:r>
-            <a:r>
               <a:rPr lang="ru-RU" sz="2000" dirty="0" smtClean="0"/>
-              <a:t>Версиям тестируемого приложения</a:t>
+              <a:t>- Версиям </a:t>
+            </a:r>
+            <a:r>
+              <a:rPr lang="ru-RU" sz="2000" dirty="0" smtClean="0"/>
+              <a:t>тестируемого </a:t>
+            </a:r>
+            <a:r>
+              <a:rPr lang="ru-RU" sz="2000" dirty="0" smtClean="0"/>
+              <a:t>приложения</a:t>
+            </a:r>
+            <a:endParaRPr lang="en-US" sz="2000" dirty="0" smtClean="0"/>
+          </a:p>
+          <a:p>
+            <a:pPr lvl="0"/>
+            <a:r>
+              <a:rPr lang="ru-RU" sz="2000" dirty="0" smtClean="0"/>
+              <a:t>- Функциональности</a:t>
             </a:r>
             <a:endParaRPr lang="en-US" sz="2000" dirty="0"/>
           </a:p>
@@ -26567,7 +26541,7 @@
   <a:extraClrSchemeLst/>
   <a:extLst>
     <a:ext uri="{05A4C25C-085E-4340-85A3-A5531E510DB2}">
-      <thm15:themeFamily xmlns:thm15="http://schemas.microsoft.com/office/thememl/2012/main" name="Office Theme" id="{62F939B6-93AF-4DB8-9C6B-D6C7DFDC589F}" vid="{4A3C46E8-61CC-4603-A589-7422A47A8E4A}"/>
+      <thm15:themeFamily xmlns:thm15="http://schemas.microsoft.com/office/thememl/2012/main" xmlns="" name="Office Theme" id="{62F939B6-93AF-4DB8-9C6B-D6C7DFDC589F}" vid="{4A3C46E8-61CC-4603-A589-7422A47A8E4A}"/>
     </a:ext>
   </a:extLst>
 </a:theme>

</xml_diff>